<commit_message>
modify manual to include find_06.m
</commit_message>
<xml_diff>
--- a/XPETS Experimental Manual.pptx
+++ b/XPETS Experimental Manual.pptx
@@ -5,10 +5,10 @@
     <p:sldMasterId id="2147483664" r:id="rId1"/>
   </p:sldMasterIdLst>
   <p:notesMasterIdLst>
-    <p:notesMasterId r:id="rId21"/>
+    <p:notesMasterId r:id="rId22"/>
   </p:notesMasterIdLst>
   <p:handoutMasterIdLst>
-    <p:handoutMasterId r:id="rId22"/>
+    <p:handoutMasterId r:id="rId23"/>
   </p:handoutMasterIdLst>
   <p:sldIdLst>
     <p:sldId id="260" r:id="rId2"/>
@@ -30,6 +30,7 @@
     <p:sldId id="635" r:id="rId18"/>
     <p:sldId id="636" r:id="rId19"/>
     <p:sldId id="637" r:id="rId20"/>
+    <p:sldId id="639" r:id="rId21"/>
   </p:sldIdLst>
   <p:sldSz cx="9144000" cy="6858000" type="screen4x3"/>
   <p:notesSz cx="7315200" cy="9601200"/>
@@ -7063,7 +7064,6 @@
               <a:rPr lang="en-US" dirty="0"/>
               <a:t>”</a:t>
             </a:r>
-            <a:endParaRPr lang="en-US" dirty="0"/>
           </a:p>
         </p:txBody>
       </p:sp>
@@ -8989,6 +8989,145 @@
 </p:sld>
 </file>
 
+<file path=ppt/slides/slide20.xml><?xml version="1.0" encoding="utf-8"?>
+<p:sld xmlns:a="http://schemas.openxmlformats.org/drawingml/2006/main" xmlns:r="http://schemas.openxmlformats.org/officeDocument/2006/relationships" xmlns:p="http://schemas.openxmlformats.org/presentationml/2006/main">
+  <p:cSld>
+    <p:spTree>
+      <p:nvGrpSpPr>
+        <p:cNvPr id="1" name=""/>
+        <p:cNvGrpSpPr/>
+        <p:nvPr/>
+      </p:nvGrpSpPr>
+      <p:grpSpPr>
+        <a:xfrm>
+          <a:off x="0" y="0"/>
+          <a:ext cx="0" cy="0"/>
+          <a:chOff x="0" y="0"/>
+          <a:chExt cx="0" cy="0"/>
+        </a:xfrm>
+      </p:grpSpPr>
+      <p:sp>
+        <p:nvSpPr>
+          <p:cNvPr id="2" name="Title 1"/>
+          <p:cNvSpPr>
+            <a:spLocks noGrp="1"/>
+          </p:cNvSpPr>
+          <p:nvPr>
+            <p:ph type="title"/>
+          </p:nvPr>
+        </p:nvSpPr>
+        <p:spPr/>
+        <p:txBody>
+          <a:bodyPr/>
+          <a:lstStyle/>
+          <a:p>
+            <a:r>
+              <a:rPr lang="en-US" dirty="0" smtClean="0"/>
+              <a:t>UPDATE: 7/30/15</a:t>
+            </a:r>
+            <a:endParaRPr lang="en-US" dirty="0"/>
+          </a:p>
+        </p:txBody>
+      </p:sp>
+      <p:sp>
+        <p:nvSpPr>
+          <p:cNvPr id="3" name="Content Placeholder 2"/>
+          <p:cNvSpPr>
+            <a:spLocks noGrp="1"/>
+          </p:cNvSpPr>
+          <p:nvPr>
+            <p:ph idx="1"/>
+          </p:nvPr>
+        </p:nvSpPr>
+        <p:spPr/>
+        <p:txBody>
+          <a:bodyPr/>
+          <a:lstStyle/>
+          <a:p>
+            <a:r>
+              <a:rPr lang="en-US" dirty="0" smtClean="0"/>
+              <a:t>Experimental_find_06 was recently written and is working towards a good idea that Grant and Mike had. Here’s the general idea:</a:t>
+            </a:r>
+          </a:p>
+          <a:p>
+            <a:pPr lvl="1"/>
+            <a:r>
+              <a:rPr lang="en-US" dirty="0" smtClean="0"/>
+              <a:t>Mike’s module1 code is good at finding single endpoints in 2D with the corresponding pin direction</a:t>
+            </a:r>
+          </a:p>
+          <a:p>
+            <a:pPr lvl="1"/>
+            <a:r>
+              <a:rPr lang="en-US" dirty="0" smtClean="0"/>
+              <a:t>Grant rewrote experimental_find_06 so that it finds starting points based on where endpoints in multiple images intersect in 3D. This is done with a vector intersect function that calculates how close two vectors get in 3D space. </a:t>
+            </a:r>
+          </a:p>
+          <a:p>
+            <a:pPr lvl="1"/>
+            <a:r>
+              <a:rPr lang="en-US" dirty="0" smtClean="0"/>
+              <a:t>Experimental_find_06 still attempts to find the pin orientation using a sphere of checked points</a:t>
+            </a:r>
+          </a:p>
+          <a:p>
+            <a:pPr lvl="1"/>
+            <a:r>
+              <a:rPr lang="en-US" dirty="0" smtClean="0"/>
+              <a:t>Eventually, using Mike’s code that gives the 2D orientations of pin, </a:t>
+            </a:r>
+            <a:r>
+              <a:rPr lang="en-US" dirty="0" err="1" smtClean="0"/>
+              <a:t>experimental_find</a:t>
+            </a:r>
+            <a:r>
+              <a:rPr lang="en-US" dirty="0" smtClean="0"/>
+              <a:t> should be able to use the 2D orientations to yield a 3D direction that can be used as a starting direction for the “</a:t>
+            </a:r>
+            <a:r>
+              <a:rPr lang="en-US" dirty="0" err="1" smtClean="0"/>
+              <a:t>walk_along_pin.m</a:t>
+            </a:r>
+            <a:r>
+              <a:rPr lang="en-US" dirty="0" smtClean="0"/>
+              <a:t>” function. </a:t>
+            </a:r>
+            <a:endParaRPr lang="en-US" dirty="0"/>
+          </a:p>
+        </p:txBody>
+      </p:sp>
+      <p:sp>
+        <p:nvSpPr>
+          <p:cNvPr id="4" name="Text Placeholder 3"/>
+          <p:cNvSpPr>
+            <a:spLocks noGrp="1"/>
+          </p:cNvSpPr>
+          <p:nvPr>
+            <p:ph type="body" sz="quarter" idx="10"/>
+          </p:nvPr>
+        </p:nvSpPr>
+        <p:spPr/>
+        <p:txBody>
+          <a:bodyPr/>
+          <a:lstStyle/>
+          <a:p>
+            <a:endParaRPr lang="en-US"/>
+          </a:p>
+        </p:txBody>
+      </p:sp>
+    </p:spTree>
+    <p:extLst>
+      <p:ext uri="{BB962C8B-B14F-4D97-AF65-F5344CB8AC3E}">
+        <p14:creationId xmlns:p14="http://schemas.microsoft.com/office/powerpoint/2010/main" val="1694330037"/>
+      </p:ext>
+    </p:extLst>
+  </p:cSld>
+  <p:clrMapOvr>
+    <a:masterClrMapping/>
+  </p:clrMapOvr>
+</p:sld>
+</file>
+
 <file path=ppt/slides/slide3.xml><?xml version="1.0" encoding="utf-8"?>
 <p:sld xmlns:a="http://schemas.openxmlformats.org/drawingml/2006/main" xmlns:r="http://schemas.openxmlformats.org/officeDocument/2006/relationships" xmlns:p="http://schemas.openxmlformats.org/presentationml/2006/main">
   <p:cSld>
@@ -9377,7 +9516,7 @@
           <a:graphicData uri="http://schemas.openxmlformats.org/presentationml/2006/ole">
             <mc:AlternateContent xmlns:mc="http://schemas.openxmlformats.org/markup-compatibility/2006">
               <mc:Choice xmlns:v="urn:schemas-microsoft-com:vml" Requires="v">
-                <p:oleObj spid="_x0000_s1117" name="Equation" r:id="rId4" imgW="215640" imgH="152280" progId="Equation.DSMT4">
+                <p:oleObj spid="_x0000_s1131" name="Equation" r:id="rId4" imgW="215640" imgH="152280" progId="Equation.DSMT4">
                   <p:embed/>
                 </p:oleObj>
               </mc:Choice>
@@ -9434,7 +9573,7 @@
           <a:graphicData uri="http://schemas.openxmlformats.org/presentationml/2006/ole">
             <mc:AlternateContent xmlns:mc="http://schemas.openxmlformats.org/markup-compatibility/2006">
               <mc:Choice xmlns:v="urn:schemas-microsoft-com:vml" Requires="v">
-                <p:oleObj spid="_x0000_s1118" name="Equation" r:id="rId6" imgW="215640" imgH="139680" progId="Equation.DSMT4">
+                <p:oleObj spid="_x0000_s1132" name="Equation" r:id="rId6" imgW="215640" imgH="139680" progId="Equation.DSMT4">
                   <p:embed/>
                 </p:oleObj>
               </mc:Choice>
@@ -9491,7 +9630,7 @@
           <a:graphicData uri="http://schemas.openxmlformats.org/presentationml/2006/ole">
             <mc:AlternateContent xmlns:mc="http://schemas.openxmlformats.org/markup-compatibility/2006">
               <mc:Choice xmlns:v="urn:schemas-microsoft-com:vml" Requires="v">
-                <p:oleObj spid="_x0000_s1119" name="Equation" r:id="rId8" imgW="228600" imgH="177480" progId="Equation.DSMT4">
+                <p:oleObj spid="_x0000_s1133" name="Equation" r:id="rId8" imgW="228600" imgH="177480" progId="Equation.DSMT4">
                   <p:embed/>
                 </p:oleObj>
               </mc:Choice>
@@ -9891,7 +10030,7 @@
           <a:graphicData uri="http://schemas.openxmlformats.org/presentationml/2006/ole">
             <mc:AlternateContent xmlns:mc="http://schemas.openxmlformats.org/markup-compatibility/2006">
               <mc:Choice xmlns:v="urn:schemas-microsoft-com:vml" Requires="v">
-                <p:oleObj spid="_x0000_s1120" name="Equation" r:id="rId10" imgW="419040" imgH="203040" progId="Equation.DSMT4">
+                <p:oleObj spid="_x0000_s1134" name="Equation" r:id="rId10" imgW="419040" imgH="203040" progId="Equation.DSMT4">
                   <p:embed/>
                 </p:oleObj>
               </mc:Choice>
@@ -9948,7 +10087,7 @@
           <a:graphicData uri="http://schemas.openxmlformats.org/presentationml/2006/ole">
             <mc:AlternateContent xmlns:mc="http://schemas.openxmlformats.org/markup-compatibility/2006">
               <mc:Choice xmlns:v="urn:schemas-microsoft-com:vml" Requires="v">
-                <p:oleObj spid="_x0000_s1121" name="Equation" r:id="rId12" imgW="368280" imgH="203040" progId="Equation.DSMT4">
+                <p:oleObj spid="_x0000_s1135" name="Equation" r:id="rId12" imgW="368280" imgH="203040" progId="Equation.DSMT4">
                   <p:embed/>
                 </p:oleObj>
               </mc:Choice>
@@ -10092,7 +10231,7 @@
           <a:graphicData uri="http://schemas.openxmlformats.org/presentationml/2006/ole">
             <mc:AlternateContent xmlns:mc="http://schemas.openxmlformats.org/markup-compatibility/2006">
               <mc:Choice xmlns:v="urn:schemas-microsoft-com:vml" Requires="v">
-                <p:oleObj spid="_x0000_s1122" name="Equation" r:id="rId14" imgW="342720" imgH="203040" progId="Equation.DSMT4">
+                <p:oleObj spid="_x0000_s1136" name="Equation" r:id="rId14" imgW="342720" imgH="203040" progId="Equation.DSMT4">
                   <p:embed/>
                 </p:oleObj>
               </mc:Choice>
@@ -10209,7 +10348,7 @@
           <a:graphicData uri="http://schemas.openxmlformats.org/presentationml/2006/ole">
             <mc:AlternateContent xmlns:mc="http://schemas.openxmlformats.org/markup-compatibility/2006">
               <mc:Choice xmlns:v="urn:schemas-microsoft-com:vml" Requires="v">
-                <p:oleObj spid="_x0000_s1123" name="Equation" r:id="rId16" imgW="330120" imgH="203040" progId="Equation.DSMT4">
+                <p:oleObj spid="_x0000_s1137" name="Equation" r:id="rId16" imgW="330120" imgH="203040" progId="Equation.DSMT4">
                   <p:embed/>
                 </p:oleObj>
               </mc:Choice>
@@ -11756,7 +11895,7 @@
           <a:graphicData uri="http://schemas.openxmlformats.org/presentationml/2006/ole">
             <mc:AlternateContent xmlns:mc="http://schemas.openxmlformats.org/markup-compatibility/2006">
               <mc:Choice xmlns:v="urn:schemas-microsoft-com:vml" Requires="v">
-                <p:oleObj spid="_x0000_s2110" name="Equation" r:id="rId3" imgW="3276360" imgH="482400" progId="Equation.DSMT4">
+                <p:oleObj spid="_x0000_s2122" name="Equation" r:id="rId3" imgW="3276360" imgH="482400" progId="Equation.DSMT4">
                   <p:embed/>
                 </p:oleObj>
               </mc:Choice>
@@ -12049,7 +12188,7 @@
             <a:graphicData uri="http://schemas.openxmlformats.org/presentationml/2006/ole">
               <mc:AlternateContent xmlns:mc="http://schemas.openxmlformats.org/markup-compatibility/2006">
                 <mc:Choice xmlns:v="urn:schemas-microsoft-com:vml" Requires="v">
-                  <p:oleObj spid="_x0000_s2111" name="Equation" r:id="rId5" imgW="215640" imgH="152280" progId="Equation.DSMT4">
+                  <p:oleObj spid="_x0000_s2123" name="Equation" r:id="rId5" imgW="215640" imgH="152280" progId="Equation.DSMT4">
                     <p:embed/>
                   </p:oleObj>
                 </mc:Choice>
@@ -12106,7 +12245,7 @@
             <a:graphicData uri="http://schemas.openxmlformats.org/presentationml/2006/ole">
               <mc:AlternateContent xmlns:mc="http://schemas.openxmlformats.org/markup-compatibility/2006">
                 <mc:Choice xmlns:v="urn:schemas-microsoft-com:vml" Requires="v">
-                  <p:oleObj spid="_x0000_s2112" name="Equation" r:id="rId7" imgW="228600" imgH="177480" progId="Equation.DSMT4">
+                  <p:oleObj spid="_x0000_s2124" name="Equation" r:id="rId7" imgW="228600" imgH="177480" progId="Equation.DSMT4">
                     <p:embed/>
                   </p:oleObj>
                 </mc:Choice>
@@ -12475,7 +12614,7 @@
             <a:graphicData uri="http://schemas.openxmlformats.org/presentationml/2006/ole">
               <mc:AlternateContent xmlns:mc="http://schemas.openxmlformats.org/markup-compatibility/2006">
                 <mc:Choice xmlns:v="urn:schemas-microsoft-com:vml" Requires="v">
-                  <p:oleObj spid="_x0000_s2113" name="Equation" r:id="rId9" imgW="419040" imgH="203040" progId="Equation.DSMT4">
+                  <p:oleObj spid="_x0000_s2125" name="Equation" r:id="rId9" imgW="419040" imgH="203040" progId="Equation.DSMT4">
                     <p:embed/>
                   </p:oleObj>
                 </mc:Choice>
@@ -12532,7 +12671,7 @@
             <a:graphicData uri="http://schemas.openxmlformats.org/presentationml/2006/ole">
               <mc:AlternateContent xmlns:mc="http://schemas.openxmlformats.org/markup-compatibility/2006">
                 <mc:Choice xmlns:v="urn:schemas-microsoft-com:vml" Requires="v">
-                  <p:oleObj spid="_x0000_s2114" name="Equation" r:id="rId11" imgW="368280" imgH="203040" progId="Equation.DSMT4">
+                  <p:oleObj spid="_x0000_s2126" name="Equation" r:id="rId11" imgW="368280" imgH="203040" progId="Equation.DSMT4">
                     <p:embed/>
                   </p:oleObj>
                 </mc:Choice>
@@ -12820,7 +12959,7 @@
             <a:graphicData uri="http://schemas.openxmlformats.org/presentationml/2006/ole">
               <mc:AlternateContent xmlns:mc="http://schemas.openxmlformats.org/markup-compatibility/2006">
                 <mc:Choice xmlns:v="urn:schemas-microsoft-com:vml" Requires="v">
-                  <p:oleObj spid="_x0000_s2115" name="Equation" r:id="rId13" imgW="228600" imgH="177480" progId="Equation.DSMT4">
+                  <p:oleObj spid="_x0000_s2127" name="Equation" r:id="rId13" imgW="228600" imgH="177480" progId="Equation.DSMT4">
                     <p:embed/>
                   </p:oleObj>
                 </mc:Choice>
@@ -13166,7 +13305,7 @@
             <a:graphicData uri="http://schemas.openxmlformats.org/presentationml/2006/ole">
               <mc:AlternateContent xmlns:mc="http://schemas.openxmlformats.org/markup-compatibility/2006">
                 <mc:Choice xmlns:v="urn:schemas-microsoft-com:vml" Requires="v">
-                  <p:oleObj spid="_x0000_s3126" name="Equation" r:id="rId3" imgW="215640" imgH="139680" progId="Equation.DSMT4">
+                  <p:oleObj spid="_x0000_s3138" name="Equation" r:id="rId3" imgW="215640" imgH="139680" progId="Equation.DSMT4">
                     <p:embed/>
                   </p:oleObj>
                 </mc:Choice>
@@ -13223,7 +13362,7 @@
             <a:graphicData uri="http://schemas.openxmlformats.org/presentationml/2006/ole">
               <mc:AlternateContent xmlns:mc="http://schemas.openxmlformats.org/markup-compatibility/2006">
                 <mc:Choice xmlns:v="urn:schemas-microsoft-com:vml" Requires="v">
-                  <p:oleObj spid="_x0000_s3127" name="Equation" r:id="rId5" imgW="228600" imgH="177480" progId="Equation.DSMT4">
+                  <p:oleObj spid="_x0000_s3139" name="Equation" r:id="rId5" imgW="228600" imgH="177480" progId="Equation.DSMT4">
                     <p:embed/>
                   </p:oleObj>
                 </mc:Choice>
@@ -13550,7 +13689,7 @@
             <a:graphicData uri="http://schemas.openxmlformats.org/presentationml/2006/ole">
               <mc:AlternateContent xmlns:mc="http://schemas.openxmlformats.org/markup-compatibility/2006">
                 <mc:Choice xmlns:v="urn:schemas-microsoft-com:vml" Requires="v">
-                  <p:oleObj spid="_x0000_s3128" name="Equation" r:id="rId7" imgW="419040" imgH="203040" progId="Equation.DSMT4">
+                  <p:oleObj spid="_x0000_s3140" name="Equation" r:id="rId7" imgW="419040" imgH="203040" progId="Equation.DSMT4">
                     <p:embed/>
                   </p:oleObj>
                 </mc:Choice>
@@ -13607,7 +13746,7 @@
             <a:graphicData uri="http://schemas.openxmlformats.org/presentationml/2006/ole">
               <mc:AlternateContent xmlns:mc="http://schemas.openxmlformats.org/markup-compatibility/2006">
                 <mc:Choice xmlns:v="urn:schemas-microsoft-com:vml" Requires="v">
-                  <p:oleObj spid="_x0000_s3129" name="Equation" r:id="rId9" imgW="368280" imgH="203040" progId="Equation.DSMT4">
+                  <p:oleObj spid="_x0000_s3141" name="Equation" r:id="rId9" imgW="368280" imgH="203040" progId="Equation.DSMT4">
                     <p:embed/>
                   </p:oleObj>
                 </mc:Choice>
@@ -14340,7 +14479,7 @@
           <a:graphicData uri="http://schemas.openxmlformats.org/presentationml/2006/ole">
             <mc:AlternateContent xmlns:mc="http://schemas.openxmlformats.org/markup-compatibility/2006">
               <mc:Choice xmlns:v="urn:schemas-microsoft-com:vml" Requires="v">
-                <p:oleObj spid="_x0000_s3130" name="Equation" r:id="rId11" imgW="3797280" imgH="431640" progId="Equation.DSMT4">
+                <p:oleObj spid="_x0000_s3142" name="Equation" r:id="rId11" imgW="3797280" imgH="431640" progId="Equation.DSMT4">
                   <p:embed/>
                 </p:oleObj>
               </mc:Choice>
@@ -14402,7 +14541,7 @@
           <a:graphicData uri="http://schemas.openxmlformats.org/presentationml/2006/ole">
             <mc:AlternateContent xmlns:mc="http://schemas.openxmlformats.org/markup-compatibility/2006">
               <mc:Choice xmlns:v="urn:schemas-microsoft-com:vml" Requires="v">
-                <p:oleObj spid="_x0000_s3131" name="Equation" r:id="rId13" imgW="469800" imgH="406080" progId="Equation.DSMT4">
+                <p:oleObj spid="_x0000_s3143" name="Equation" r:id="rId13" imgW="469800" imgH="406080" progId="Equation.DSMT4">
                   <p:embed/>
                 </p:oleObj>
               </mc:Choice>

</xml_diff>